<commit_message>
MAJ des cours et ???
</commit_message>
<xml_diff>
--- a/TUTO_BDD_GONIO.pptx
+++ b/TUTO_BDD_GONIO.pptx
@@ -5,7 +5,7 @@
     <p:sldMasterId id="2147483660" r:id="rId1"/>
   </p:sldMasterIdLst>
   <p:notesMasterIdLst>
-    <p:notesMasterId r:id="rId11"/>
+    <p:notesMasterId r:id="rId10"/>
   </p:notesMasterIdLst>
   <p:sldIdLst>
     <p:sldId id="258" r:id="rId2"/>
@@ -13,10 +13,9 @@
     <p:sldId id="260" r:id="rId4"/>
     <p:sldId id="264" r:id="rId5"/>
     <p:sldId id="267" r:id="rId6"/>
-    <p:sldId id="262" r:id="rId7"/>
-    <p:sldId id="261" r:id="rId8"/>
-    <p:sldId id="266" r:id="rId9"/>
-    <p:sldId id="265" r:id="rId10"/>
+    <p:sldId id="261" r:id="rId7"/>
+    <p:sldId id="266" r:id="rId8"/>
+    <p:sldId id="265" r:id="rId9"/>
   </p:sldIdLst>
   <p:sldSz cx="9144000" cy="6858000" type="screen4x3"/>
   <p:notesSz cx="6858000" cy="9144000"/>
@@ -205,7 +204,7 @@
           <a:p>
             <a:fld id="{BDF2A71B-5DC1-4CC3-81B5-30C08E317B94}" type="datetimeFigureOut">
               <a:rPr lang="fr-FR" smtClean="0"/>
-              <a:t>15/07/2021</a:t>
+              <a:t>13/04/2022</a:t>
             </a:fld>
             <a:endParaRPr lang="fr-FR"/>
           </a:p>
@@ -715,7 +714,7 @@
             <a:fld id="{96E473C4-7BD1-414A-9C3D-208F5482DDB0}" type="slidenum">
               <a:rPr lang="fr-FR" smtClean="0"/>
               <a:pPr/>
-              <a:t>9</a:t>
+              <a:t>8</a:t>
             </a:fld>
             <a:endParaRPr lang="fr-FR"/>
           </a:p>
@@ -768,7 +767,7 @@
           <a:p>
             <a:fld id="{2AD8A078-8F0D-4B44-934F-D3DB161891DE}" type="datetimeFigureOut">
               <a:rPr lang="fr-FR" smtClean="0"/>
-              <a:t>15/07/2021</a:t>
+              <a:t>13/04/2022</a:t>
             </a:fld>
             <a:endParaRPr lang="fr-FR"/>
           </a:p>
@@ -981,7 +980,7 @@
           <a:p>
             <a:fld id="{2AD8A078-8F0D-4B44-934F-D3DB161891DE}" type="datetimeFigureOut">
               <a:rPr lang="fr-FR" smtClean="0"/>
-              <a:t>15/07/2021</a:t>
+              <a:t>13/04/2022</a:t>
             </a:fld>
             <a:endParaRPr lang="fr-FR"/>
           </a:p>
@@ -1431,11 +1430,7 @@
             <a:pPr algn="ctr"/>
             <a:r>
               <a:rPr lang="fr-FR" sz="3200" b="1" dirty="0" smtClean="0"/>
-              <a:t>Tutoriel </a:t>
-            </a:r>
-            <a:r>
-              <a:rPr lang="fr-FR" sz="3200" b="1" dirty="0" smtClean="0"/>
-              <a:t>BDD_GONIO_V9</a:t>
+              <a:t>Tutoriel BDD_GONIO_V9</a:t>
             </a:r>
             <a:endParaRPr lang="fr-FR" sz="1600" b="1" dirty="0" smtClean="0"/>
           </a:p>
@@ -1465,19 +1460,7 @@
           <a:p>
             <a:r>
               <a:rPr lang="fr-FR" sz="2000" dirty="0" smtClean="0"/>
-              <a:t>La </a:t>
-            </a:r>
-            <a:r>
-              <a:rPr lang="fr-FR" sz="2000" dirty="0" smtClean="0"/>
-              <a:t>BDD GONIO </a:t>
-            </a:r>
-            <a:r>
-              <a:rPr lang="fr-FR" sz="2000" dirty="0" smtClean="0"/>
-              <a:t>est un </a:t>
-            </a:r>
-            <a:r>
-              <a:rPr lang="fr-FR" sz="2000" dirty="0" smtClean="0"/>
-              <a:t>tableau de suivi et d’export des relevés goniométriques.</a:t>
+              <a:t>La BDD GONIO est un tableau de suivi et d’export des relevés goniométriques.</a:t>
             </a:r>
           </a:p>
           <a:p>
@@ -2596,7 +2579,6 @@
               <a:rPr lang="fr-FR" sz="2000" dirty="0" smtClean="0"/>
               <a:t>GROUPE</a:t>
             </a:r>
-            <a:endParaRPr lang="fr-FR" sz="2000" dirty="0" smtClean="0"/>
           </a:p>
         </p:txBody>
       </p:sp>
@@ -2653,7 +2635,15 @@
           <a:p>
             <a:r>
               <a:rPr lang="fr-FR" dirty="0" smtClean="0"/>
-              <a:t>Pour générer un tir, seul les colonnes X/LONG CAPT, Y/LAT CAPT et AZM sont nécessaires.</a:t>
+              <a:t>Pour générer un tir, </a:t>
+            </a:r>
+            <a:r>
+              <a:rPr lang="fr-FR" dirty="0" smtClean="0"/>
+              <a:t>seules </a:t>
+            </a:r>
+            <a:r>
+              <a:rPr lang="fr-FR" dirty="0" smtClean="0"/>
+              <a:t>les colonnes X/LONG CAPT, Y/LAT CAPT et AZM sont nécessaires.</a:t>
             </a:r>
           </a:p>
           <a:p>
@@ -2709,8 +2699,9 @@
             </a:r>
             <a:r>
               <a:rPr lang="fr-FR" dirty="0" smtClean="0"/>
-              <a:t>32,8298« </a:t>
-            </a:r>
+              <a:t>32,8298"</a:t>
+            </a:r>
+            <a:endParaRPr lang="fr-FR" dirty="0" smtClean="0"/>
           </a:p>
           <a:p>
             <a:endParaRPr lang="fr-FR" dirty="0"/>
@@ -2718,11 +2709,7 @@
           <a:p>
             <a:r>
               <a:rPr lang="fr-FR" dirty="0" smtClean="0"/>
-              <a:t>Si une coordonnée ou un azimut est vide ou illisible, la ligne </a:t>
-            </a:r>
-            <a:r>
-              <a:rPr lang="fr-FR" smtClean="0"/>
-              <a:t>sera marquée en « PROBLEME »</a:t>
+              <a:t>Si une coordonnée ou un azimut est vide ou illisible, la ligne sera marquée en « PROBLEME »</a:t>
             </a:r>
             <a:endParaRPr lang="fr-FR" dirty="0"/>
           </a:p>
@@ -2791,7 +2778,7 @@
       </p:grpSpPr>
       <p:sp>
         <p:nvSpPr>
-          <p:cNvPr id="3" name="ZoneTexte 2"/>
+          <p:cNvPr id="2" name="ZoneTexte 1"/>
           <p:cNvSpPr txBox="1"/>
           <p:nvPr/>
         </p:nvSpPr>
@@ -2814,16 +2801,190 @@
             <a:pPr algn="ctr"/>
             <a:r>
               <a:rPr lang="fr-FR" sz="2000" b="1" dirty="0" smtClean="0"/>
-              <a:t>Résultat</a:t>
+              <a:t>Rappels</a:t>
             </a:r>
             <a:endParaRPr lang="fr-FR" sz="2000" b="1" dirty="0"/>
+          </a:p>
+        </p:txBody>
+      </p:sp>
+      <p:sp>
+        <p:nvSpPr>
+          <p:cNvPr id="3" name="ZoneTexte 2"/>
+          <p:cNvSpPr txBox="1"/>
+          <p:nvPr/>
+        </p:nvSpPr>
+        <p:spPr>
+          <a:xfrm>
+            <a:off x="491319" y="1173707"/>
+            <a:ext cx="8120418" cy="5355312"/>
+          </a:xfrm>
+          <a:prstGeom prst="rect">
+            <a:avLst/>
+          </a:prstGeom>
+          <a:noFill/>
+        </p:spPr>
+        <p:txBody>
+          <a:bodyPr wrap="square" rtlCol="0">
+            <a:spAutoFit/>
+          </a:bodyPr>
+          <a:lstStyle/>
+          <a:p>
+            <a:pPr marL="285750" indent="-285750">
+              <a:buFontTx/>
+              <a:buChar char="-"/>
+            </a:pPr>
+            <a:r>
+              <a:rPr lang="fr-FR" dirty="0" smtClean="0"/>
+              <a:t>Cet outil a pour but de lister des relevés </a:t>
+            </a:r>
+            <a:r>
+              <a:rPr lang="fr-FR" dirty="0" err="1" smtClean="0"/>
+              <a:t>gonio</a:t>
+            </a:r>
+            <a:r>
+              <a:rPr lang="fr-FR" dirty="0" smtClean="0"/>
+              <a:t> pour créer un fichier KML importable sur </a:t>
+            </a:r>
+            <a:r>
+              <a:rPr lang="fr-FR" dirty="0" err="1" smtClean="0"/>
+              <a:t>GlobalMapper</a:t>
+            </a:r>
+            <a:r>
+              <a:rPr lang="fr-FR" dirty="0" smtClean="0"/>
+              <a:t>, et ainsi avoir un visuel des relevés effectués sur telle fréquence, tel indicatif</a:t>
+            </a:r>
+          </a:p>
+          <a:p>
+            <a:pPr marL="285750" indent="-285750">
+              <a:buFontTx/>
+              <a:buChar char="-"/>
+            </a:pPr>
+            <a:endParaRPr lang="fr-FR" dirty="0" smtClean="0"/>
+          </a:p>
+          <a:p>
+            <a:pPr marL="285750" indent="-285750">
+              <a:buFontTx/>
+              <a:buChar char="-"/>
+            </a:pPr>
+            <a:r>
+              <a:rPr lang="fr-FR" dirty="0" smtClean="0"/>
+              <a:t>Pour être valide, un tir a besoin AU MINIMUM de la position Y et X (latitude et longitude) du capteur et d’un azimut</a:t>
+            </a:r>
+          </a:p>
+          <a:p>
+            <a:pPr marL="285750" indent="-285750">
+              <a:buFontTx/>
+              <a:buChar char="-"/>
+            </a:pPr>
+            <a:endParaRPr lang="fr-FR" dirty="0"/>
+          </a:p>
+          <a:p>
+            <a:pPr marL="285750" indent="-285750">
+              <a:buFontTx/>
+              <a:buChar char="-"/>
+            </a:pPr>
+            <a:r>
+              <a:rPr lang="fr-FR" dirty="0" smtClean="0"/>
+              <a:t>Les coordonnées peuvent être indiquées en degré/minutes/secondes ou en décimales, pourvu que le format ne soit pas trop exotique</a:t>
+            </a:r>
+          </a:p>
+          <a:p>
+            <a:pPr marL="285750" indent="-285750">
+              <a:buFontTx/>
+              <a:buChar char="-"/>
+            </a:pPr>
+            <a:endParaRPr lang="fr-FR" dirty="0"/>
+          </a:p>
+          <a:p>
+            <a:pPr marL="285750" indent="-285750">
+              <a:buFontTx/>
+              <a:buChar char="-"/>
+            </a:pPr>
+            <a:r>
+              <a:rPr lang="fr-FR" dirty="0" smtClean="0"/>
+              <a:t>Un convertisseur DMS &lt;-&gt; décimales est inclus dans l’outil si besoin</a:t>
+            </a:r>
+          </a:p>
+          <a:p>
+            <a:pPr marL="285750" indent="-285750">
+              <a:buFontTx/>
+              <a:buChar char="-"/>
+            </a:pPr>
+            <a:endParaRPr lang="fr-FR" dirty="0"/>
+          </a:p>
+          <a:p>
+            <a:pPr marL="285750" indent="-285750">
+              <a:buFontTx/>
+              <a:buChar char="-"/>
+            </a:pPr>
+            <a:r>
+              <a:rPr lang="fr-FR" dirty="0" smtClean="0"/>
+              <a:t>Les tirs sont nommés automatiquement de la façon suivante : « GDH / FRQ / API »</a:t>
+            </a:r>
+          </a:p>
+          <a:p>
+            <a:pPr marL="285750" indent="-285750">
+              <a:buFontTx/>
+              <a:buChar char="-"/>
+            </a:pPr>
+            <a:endParaRPr lang="fr-FR" dirty="0"/>
+          </a:p>
+          <a:p>
+            <a:pPr marL="285750" indent="-285750">
+              <a:buFontTx/>
+              <a:buChar char="-"/>
+            </a:pPr>
+            <a:r>
+              <a:rPr lang="fr-FR" dirty="0" smtClean="0"/>
+              <a:t>Les tirs peuvent avoir les couleurs suivantes </a:t>
+            </a:r>
+            <a:r>
+              <a:rPr lang="fr-FR" dirty="0"/>
+              <a:t>: bleu, rouge, jaune, vert, violet, orange, rose, gris, noir et </a:t>
+            </a:r>
+            <a:r>
+              <a:rPr lang="fr-FR" dirty="0" smtClean="0"/>
+              <a:t>blanc.</a:t>
+            </a:r>
+          </a:p>
+          <a:p>
+            <a:pPr marL="285750" indent="-285750">
+              <a:buFontTx/>
+              <a:buChar char="-"/>
+            </a:pPr>
+            <a:endParaRPr lang="fr-FR" dirty="0"/>
+          </a:p>
+          <a:p>
+            <a:pPr marL="285750" indent="-285750">
+              <a:buFontTx/>
+              <a:buChar char="-"/>
+            </a:pPr>
+            <a:r>
+              <a:rPr lang="fr-FR" dirty="0" smtClean="0"/>
+              <a:t>Il suffit de faire glisser le fichier KML dans </a:t>
+            </a:r>
+            <a:r>
+              <a:rPr lang="fr-FR" dirty="0" err="1" smtClean="0"/>
+              <a:t>GlobalMapper</a:t>
+            </a:r>
+            <a:r>
+              <a:rPr lang="fr-FR" dirty="0" smtClean="0"/>
+              <a:t> pour l’importer</a:t>
+            </a:r>
+          </a:p>
+          <a:p>
+            <a:pPr marL="285750" indent="-285750">
+              <a:buFontTx/>
+              <a:buChar char="-"/>
+            </a:pPr>
+            <a:endParaRPr lang="fr-FR" dirty="0"/>
           </a:p>
         </p:txBody>
       </p:sp>
     </p:spTree>
     <p:extLst>
       <p:ext uri="{BB962C8B-B14F-4D97-AF65-F5344CB8AC3E}">
-        <p14:creationId xmlns:p14="http://schemas.microsoft.com/office/powerpoint/2010/main" val="1107000766"/>
+        <p14:creationId xmlns:p14="http://schemas.microsoft.com/office/powerpoint/2010/main" val="2842698796"/>
       </p:ext>
     </p:extLst>
   </p:cSld>
@@ -2890,7 +3051,7 @@
         <p:spPr>
           <a:xfrm>
             <a:off x="491319" y="1173707"/>
-            <a:ext cx="8120418" cy="5355312"/>
+            <a:ext cx="8120418" cy="2585323"/>
           </a:xfrm>
           <a:prstGeom prst="rect">
             <a:avLst/>
@@ -2909,15 +3070,24 @@
             </a:pPr>
             <a:r>
               <a:rPr lang="fr-FR" dirty="0" smtClean="0"/>
-              <a:t>Cet outil a pour but de lister des relevés </a:t>
-            </a:r>
-            <a:r>
-              <a:rPr lang="fr-FR" dirty="0" err="1" smtClean="0"/>
-              <a:t>gonio</a:t>
-            </a:r>
+              <a:t>Les tirs sont nommés automatiquement de la façon suivante : « GDH / FRQ / API »</a:t>
+            </a:r>
+          </a:p>
+          <a:p>
+            <a:pPr marL="285750" indent="-285750">
+              <a:buFontTx/>
+              <a:buChar char="-"/>
+            </a:pPr>
+            <a:endParaRPr lang="fr-FR" dirty="0"/>
+          </a:p>
+          <a:p>
+            <a:pPr marL="285750" indent="-285750">
+              <a:buFontTx/>
+              <a:buChar char="-"/>
+            </a:pPr>
             <a:r>
               <a:rPr lang="fr-FR" dirty="0" smtClean="0"/>
-              <a:t> pour créer un fichier KML importable sur </a:t>
+              <a:t>Il suffit de faire glisser le fichier KML dans </a:t>
             </a:r>
             <a:r>
               <a:rPr lang="fr-FR" dirty="0" err="1" smtClean="0"/>
@@ -2925,7 +3095,7 @@
             </a:r>
             <a:r>
               <a:rPr lang="fr-FR" dirty="0" smtClean="0"/>
-              <a:t>, et ainsi avoir un visuel des relevés effectués sur telle fréquence, tel indicatif</a:t>
+              <a:t> pour l’importer</a:t>
             </a:r>
           </a:p>
           <a:p>
@@ -2942,7 +3112,7 @@
             </a:pPr>
             <a:r>
               <a:rPr lang="fr-FR" dirty="0" smtClean="0"/>
-              <a:t>Pour être valide, un tir a besoin AU MINIMUM de la position Y et X (latitude et longitude) du capteur et d’un azimut</a:t>
+              <a:t>Les relevés et les points positions capteur ont pour attributs (métadonnées vecteur) toutes les données indiquées dans le tableau</a:t>
             </a:r>
           </a:p>
           <a:p>
@@ -2959,98 +3129,12 @@
             </a:pPr>
             <a:r>
               <a:rPr lang="fr-FR" dirty="0" smtClean="0"/>
-              <a:t>Les coordonnées peuvent être indiquées en degré/minutes/secondes ou en décimales, pourvu que le format ne soit pas trop exotique</a:t>
-            </a:r>
-          </a:p>
-          <a:p>
-            <a:pPr marL="285750" indent="-285750">
-              <a:buFontTx/>
-              <a:buChar char="-"/>
-            </a:pPr>
-            <a:endParaRPr lang="fr-FR" dirty="0"/>
-          </a:p>
-          <a:p>
-            <a:pPr marL="285750" indent="-285750">
-              <a:buFontTx/>
-              <a:buChar char="-"/>
-            </a:pPr>
-            <a:r>
-              <a:rPr lang="fr-FR" dirty="0" smtClean="0"/>
-              <a:t>Un convertisseur DMS &lt;-&gt; décimales est inclus dans l’outil si besoin</a:t>
-            </a:r>
-          </a:p>
-          <a:p>
-            <a:pPr marL="285750" indent="-285750">
-              <a:buFontTx/>
-              <a:buChar char="-"/>
-            </a:pPr>
-            <a:endParaRPr lang="fr-FR" dirty="0"/>
-          </a:p>
-          <a:p>
-            <a:pPr marL="285750" indent="-285750">
-              <a:buFontTx/>
-              <a:buChar char="-"/>
-            </a:pPr>
-            <a:r>
-              <a:rPr lang="fr-FR" dirty="0" smtClean="0"/>
-              <a:t>Les tirs sont nommés automatiquement de la façon suivante : « GDH / FRQ / API »</a:t>
-            </a:r>
-          </a:p>
-          <a:p>
-            <a:pPr marL="285750" indent="-285750">
-              <a:buFontTx/>
-              <a:buChar char="-"/>
-            </a:pPr>
-            <a:endParaRPr lang="fr-FR" dirty="0"/>
-          </a:p>
-          <a:p>
-            <a:pPr marL="285750" indent="-285750">
-              <a:buFontTx/>
-              <a:buChar char="-"/>
-            </a:pPr>
-            <a:r>
-              <a:rPr lang="fr-FR" dirty="0" smtClean="0"/>
-              <a:t>Les tirs peuvent avoir les couleurs suivantes </a:t>
-            </a:r>
-            <a:r>
-              <a:rPr lang="fr-FR" dirty="0"/>
-              <a:t>: bleu, rouge, jaune, vert, violet, orange, rose, gris, noir et </a:t>
-            </a:r>
-            <a:r>
-              <a:rPr lang="fr-FR" dirty="0" smtClean="0"/>
-              <a:t>blanc.</a:t>
-            </a:r>
-          </a:p>
-          <a:p>
-            <a:pPr marL="285750" indent="-285750">
-              <a:buFontTx/>
-              <a:buChar char="-"/>
-            </a:pPr>
-            <a:endParaRPr lang="fr-FR" dirty="0"/>
-          </a:p>
-          <a:p>
-            <a:pPr marL="285750" indent="-285750">
-              <a:buFontTx/>
-              <a:buChar char="-"/>
-            </a:pPr>
-            <a:r>
-              <a:rPr lang="fr-FR" dirty="0" smtClean="0"/>
-              <a:t>Il suffit de faire glisser le fichier KML dans </a:t>
+              <a:t>La colonne groupe est un champ libre pour éventuellement exploitation sous </a:t>
             </a:r>
             <a:r>
               <a:rPr lang="fr-FR" dirty="0" err="1" smtClean="0"/>
               <a:t>GlobalMapper</a:t>
             </a:r>
-            <a:r>
-              <a:rPr lang="fr-FR" dirty="0" smtClean="0"/>
-              <a:t> pour l’importer</a:t>
-            </a:r>
-          </a:p>
-          <a:p>
-            <a:pPr marL="285750" indent="-285750">
-              <a:buFontTx/>
-              <a:buChar char="-"/>
-            </a:pPr>
             <a:endParaRPr lang="fr-FR" dirty="0"/>
           </a:p>
         </p:txBody>
@@ -3058,7 +3142,7 @@
     </p:spTree>
     <p:extLst>
       <p:ext uri="{BB962C8B-B14F-4D97-AF65-F5344CB8AC3E}">
-        <p14:creationId xmlns:p14="http://schemas.microsoft.com/office/powerpoint/2010/main" val="2842698796"/>
+        <p14:creationId xmlns:p14="http://schemas.microsoft.com/office/powerpoint/2010/main" val="2421691216"/>
       </p:ext>
     </p:extLst>
   </p:cSld>
@@ -3087,14 +3171,14 @@
       </p:grpSpPr>
       <p:sp>
         <p:nvSpPr>
-          <p:cNvPr id="2" name="ZoneTexte 1"/>
+          <p:cNvPr id="4" name="ZoneTexte 3"/>
           <p:cNvSpPr txBox="1"/>
           <p:nvPr/>
         </p:nvSpPr>
         <p:spPr>
           <a:xfrm>
-            <a:off x="0" y="188640"/>
-            <a:ext cx="9144000" cy="400110"/>
+            <a:off x="-20960" y="548680"/>
+            <a:ext cx="9144000" cy="584775"/>
           </a:xfrm>
           <a:prstGeom prst="rect">
             <a:avLst/>
@@ -3109,174 +3193,8 @@
           <a:p>
             <a:pPr algn="ctr"/>
             <a:r>
-              <a:rPr lang="fr-FR" sz="2000" b="1" dirty="0" smtClean="0"/>
-              <a:t>Rappels</a:t>
-            </a:r>
-            <a:endParaRPr lang="fr-FR" sz="2000" b="1" dirty="0"/>
-          </a:p>
-        </p:txBody>
-      </p:sp>
-      <p:sp>
-        <p:nvSpPr>
-          <p:cNvPr id="3" name="ZoneTexte 2"/>
-          <p:cNvSpPr txBox="1"/>
-          <p:nvPr/>
-        </p:nvSpPr>
-        <p:spPr>
-          <a:xfrm>
-            <a:off x="491319" y="1173707"/>
-            <a:ext cx="8120418" cy="2585323"/>
-          </a:xfrm>
-          <a:prstGeom prst="rect">
-            <a:avLst/>
-          </a:prstGeom>
-          <a:noFill/>
-        </p:spPr>
-        <p:txBody>
-          <a:bodyPr wrap="square" rtlCol="0">
-            <a:spAutoFit/>
-          </a:bodyPr>
-          <a:lstStyle/>
-          <a:p>
-            <a:pPr marL="285750" indent="-285750">
-              <a:buFontTx/>
-              <a:buChar char="-"/>
-            </a:pPr>
-            <a:r>
-              <a:rPr lang="fr-FR" dirty="0" smtClean="0"/>
-              <a:t>Les </a:t>
-            </a:r>
-            <a:r>
-              <a:rPr lang="fr-FR" dirty="0" smtClean="0"/>
-              <a:t>tirs sont nommés automatiquement de la façon suivante : « GDH / FRQ / API »</a:t>
-            </a:r>
-          </a:p>
-          <a:p>
-            <a:pPr marL="285750" indent="-285750">
-              <a:buFontTx/>
-              <a:buChar char="-"/>
-            </a:pPr>
-            <a:endParaRPr lang="fr-FR" dirty="0"/>
-          </a:p>
-          <a:p>
-            <a:pPr marL="285750" indent="-285750">
-              <a:buFontTx/>
-              <a:buChar char="-"/>
-            </a:pPr>
-            <a:r>
-              <a:rPr lang="fr-FR" dirty="0" smtClean="0"/>
-              <a:t>Il suffit de faire glisser le fichier KML dans </a:t>
-            </a:r>
-            <a:r>
-              <a:rPr lang="fr-FR" dirty="0" err="1" smtClean="0"/>
-              <a:t>GlobalMapper</a:t>
-            </a:r>
-            <a:r>
-              <a:rPr lang="fr-FR" dirty="0" smtClean="0"/>
-              <a:t> pour l’importer</a:t>
-            </a:r>
-          </a:p>
-          <a:p>
-            <a:pPr marL="285750" indent="-285750">
-              <a:buFontTx/>
-              <a:buChar char="-"/>
-            </a:pPr>
-            <a:endParaRPr lang="fr-FR" dirty="0" smtClean="0"/>
-          </a:p>
-          <a:p>
-            <a:pPr marL="285750" indent="-285750">
-              <a:buFontTx/>
-              <a:buChar char="-"/>
-            </a:pPr>
-            <a:r>
-              <a:rPr lang="fr-FR" dirty="0" smtClean="0"/>
-              <a:t>Les relevés et les points positions capteur ont pour attributs (métadonnées vecteur) toutes les données indiquées dans le tableau</a:t>
-            </a:r>
-          </a:p>
-          <a:p>
-            <a:pPr marL="285750" indent="-285750">
-              <a:buFontTx/>
-              <a:buChar char="-"/>
-            </a:pPr>
-            <a:endParaRPr lang="fr-FR" dirty="0"/>
-          </a:p>
-          <a:p>
-            <a:pPr marL="285750" indent="-285750">
-              <a:buFontTx/>
-              <a:buChar char="-"/>
-            </a:pPr>
-            <a:r>
-              <a:rPr lang="fr-FR" dirty="0" smtClean="0"/>
-              <a:t>La colonne groupe est un champ libre pour éventuellement exploitation sous </a:t>
-            </a:r>
-            <a:r>
-              <a:rPr lang="fr-FR" dirty="0" err="1" smtClean="0"/>
-              <a:t>GlobalMapper</a:t>
-            </a:r>
-            <a:endParaRPr lang="fr-FR" dirty="0"/>
-          </a:p>
-        </p:txBody>
-      </p:sp>
-    </p:spTree>
-    <p:extLst>
-      <p:ext uri="{BB962C8B-B14F-4D97-AF65-F5344CB8AC3E}">
-        <p14:creationId xmlns:p14="http://schemas.microsoft.com/office/powerpoint/2010/main" val="2421691216"/>
-      </p:ext>
-    </p:extLst>
-  </p:cSld>
-  <p:clrMapOvr>
-    <a:masterClrMapping/>
-  </p:clrMapOvr>
-</p:sld>
-</file>
-
-<file path=ppt/slides/slide9.xml><?xml version="1.0" encoding="utf-8"?>
-<p:sld xmlns:a="http://schemas.openxmlformats.org/drawingml/2006/main" xmlns:r="http://schemas.openxmlformats.org/officeDocument/2006/relationships" xmlns:p="http://schemas.openxmlformats.org/presentationml/2006/main">
-  <p:cSld>
-    <p:spTree>
-      <p:nvGrpSpPr>
-        <p:cNvPr id="1" name=""/>
-        <p:cNvGrpSpPr/>
-        <p:nvPr/>
-      </p:nvGrpSpPr>
-      <p:grpSpPr>
-        <a:xfrm>
-          <a:off x="0" y="0"/>
-          <a:ext cx="0" cy="0"/>
-          <a:chOff x="0" y="0"/>
-          <a:chExt cx="0" cy="0"/>
-        </a:xfrm>
-      </p:grpSpPr>
-      <p:sp>
-        <p:nvSpPr>
-          <p:cNvPr id="4" name="ZoneTexte 3"/>
-          <p:cNvSpPr txBox="1"/>
-          <p:nvPr/>
-        </p:nvSpPr>
-        <p:spPr>
-          <a:xfrm>
-            <a:off x="-20960" y="548680"/>
-            <a:ext cx="9144000" cy="584775"/>
-          </a:xfrm>
-          <a:prstGeom prst="rect">
-            <a:avLst/>
-          </a:prstGeom>
-          <a:noFill/>
-        </p:spPr>
-        <p:txBody>
-          <a:bodyPr wrap="square" rtlCol="0">
-            <a:spAutoFit/>
-          </a:bodyPr>
-          <a:lstStyle/>
-          <a:p>
-            <a:pPr algn="ctr"/>
-            <a:r>
               <a:rPr lang="fr-FR" sz="3200" b="1" dirty="0" smtClean="0"/>
-              <a:t>Utilisation avanc</a:t>
-            </a:r>
-            <a:r>
-              <a:rPr lang="fr-FR" sz="3200" b="1" dirty="0" smtClean="0"/>
-              <a:t>ée</a:t>
+              <a:t>Utilisation avancée</a:t>
             </a:r>
             <a:endParaRPr lang="fr-FR" sz="1600" b="1" dirty="0" smtClean="0"/>
           </a:p>

</xml_diff>

<commit_message>
MAJ cours, MAJ BDD GONIO et ConvCoord, nettoyage
</commit_message>
<xml_diff>
--- a/TUTO_BDD_GONIO.pptx
+++ b/TUTO_BDD_GONIO.pptx
@@ -5,7 +5,7 @@
     <p:sldMasterId id="2147483660" r:id="rId1"/>
   </p:sldMasterIdLst>
   <p:notesMasterIdLst>
-    <p:notesMasterId r:id="rId10"/>
+    <p:notesMasterId r:id="rId7"/>
   </p:notesMasterIdLst>
   <p:sldIdLst>
     <p:sldId id="258" r:id="rId2"/>
@@ -13,9 +13,6 @@
     <p:sldId id="260" r:id="rId4"/>
     <p:sldId id="264" r:id="rId5"/>
     <p:sldId id="267" r:id="rId6"/>
-    <p:sldId id="261" r:id="rId7"/>
-    <p:sldId id="266" r:id="rId8"/>
-    <p:sldId id="265" r:id="rId9"/>
   </p:sldIdLst>
   <p:sldSz cx="9144000" cy="6858000" type="screen4x3"/>
   <p:notesSz cx="6858000" cy="9144000"/>
@@ -204,7 +201,7 @@
           <a:p>
             <a:fld id="{BDF2A71B-5DC1-4CC3-81B5-30C08E317B94}" type="datetimeFigureOut">
               <a:rPr lang="fr-FR" smtClean="0"/>
-              <a:t>13/04/2022</a:t>
+              <a:t>07/09/2023</a:t>
             </a:fld>
             <a:endParaRPr lang="fr-FR"/>
           </a:p>
@@ -646,93 +643,6 @@
 </p:notes>
 </file>
 
-<file path=ppt/notesSlides/notesSlide3.xml><?xml version="1.0" encoding="utf-8"?>
-<p:notes xmlns:a="http://schemas.openxmlformats.org/drawingml/2006/main" xmlns:r="http://schemas.openxmlformats.org/officeDocument/2006/relationships" xmlns:p="http://schemas.openxmlformats.org/presentationml/2006/main">
-  <p:cSld>
-    <p:spTree>
-      <p:nvGrpSpPr>
-        <p:cNvPr id="1" name=""/>
-        <p:cNvGrpSpPr/>
-        <p:nvPr/>
-      </p:nvGrpSpPr>
-      <p:grpSpPr>
-        <a:xfrm>
-          <a:off x="0" y="0"/>
-          <a:ext cx="0" cy="0"/>
-          <a:chOff x="0" y="0"/>
-          <a:chExt cx="0" cy="0"/>
-        </a:xfrm>
-      </p:grpSpPr>
-      <p:sp>
-        <p:nvSpPr>
-          <p:cNvPr id="2" name="Espace réservé de l'image des diapositives 1"/>
-          <p:cNvSpPr>
-            <a:spLocks noGrp="1" noRot="1" noChangeAspect="1"/>
-          </p:cNvSpPr>
-          <p:nvPr>
-            <p:ph type="sldImg"/>
-          </p:nvPr>
-        </p:nvSpPr>
-        <p:spPr/>
-      </p:sp>
-      <p:sp>
-        <p:nvSpPr>
-          <p:cNvPr id="3" name="Espace réservé des commentaires 2"/>
-          <p:cNvSpPr>
-            <a:spLocks noGrp="1"/>
-          </p:cNvSpPr>
-          <p:nvPr>
-            <p:ph type="body" idx="1"/>
-          </p:nvPr>
-        </p:nvSpPr>
-        <p:spPr/>
-        <p:txBody>
-          <a:bodyPr>
-            <a:normAutofit/>
-          </a:bodyPr>
-          <a:lstStyle/>
-          <a:p>
-            <a:endParaRPr lang="fr-FR"/>
-          </a:p>
-        </p:txBody>
-      </p:sp>
-      <p:sp>
-        <p:nvSpPr>
-          <p:cNvPr id="4" name="Espace réservé du numéro de diapositive 3"/>
-          <p:cNvSpPr>
-            <a:spLocks noGrp="1"/>
-          </p:cNvSpPr>
-          <p:nvPr>
-            <p:ph type="sldNum" sz="quarter" idx="10"/>
-          </p:nvPr>
-        </p:nvSpPr>
-        <p:spPr/>
-        <p:txBody>
-          <a:bodyPr/>
-          <a:lstStyle/>
-          <a:p>
-            <a:fld id="{96E473C4-7BD1-414A-9C3D-208F5482DDB0}" type="slidenum">
-              <a:rPr lang="fr-FR" smtClean="0"/>
-              <a:pPr/>
-              <a:t>8</a:t>
-            </a:fld>
-            <a:endParaRPr lang="fr-FR"/>
-          </a:p>
-        </p:txBody>
-      </p:sp>
-    </p:spTree>
-    <p:extLst>
-      <p:ext uri="{BB962C8B-B14F-4D97-AF65-F5344CB8AC3E}">
-        <p14:creationId xmlns:p14="http://schemas.microsoft.com/office/powerpoint/2010/main" val="1670621978"/>
-      </p:ext>
-    </p:extLst>
-  </p:cSld>
-  <p:clrMapOvr>
-    <a:masterClrMapping/>
-  </p:clrMapOvr>
-</p:notes>
-</file>
-
 <file path=ppt/slideLayouts/slideLayout1.xml><?xml version="1.0" encoding="utf-8"?>
 <p:sldLayout xmlns:a="http://schemas.openxmlformats.org/drawingml/2006/main" xmlns:r="http://schemas.openxmlformats.org/officeDocument/2006/relationships" xmlns:p="http://schemas.openxmlformats.org/presentationml/2006/main" type="blank" preserve="1">
   <p:cSld name="Vide">
@@ -767,7 +677,7 @@
           <a:p>
             <a:fld id="{2AD8A078-8F0D-4B44-934F-D3DB161891DE}" type="datetimeFigureOut">
               <a:rPr lang="fr-FR" smtClean="0"/>
-              <a:t>13/04/2022</a:t>
+              <a:t>07/09/2023</a:t>
             </a:fld>
             <a:endParaRPr lang="fr-FR"/>
           </a:p>
@@ -980,7 +890,7 @@
           <a:p>
             <a:fld id="{2AD8A078-8F0D-4B44-934F-D3DB161891DE}" type="datetimeFigureOut">
               <a:rPr lang="fr-FR" smtClean="0"/>
-              <a:t>13/04/2022</a:t>
+              <a:t>07/09/2023</a:t>
             </a:fld>
             <a:endParaRPr lang="fr-FR"/>
           </a:p>
@@ -1445,7 +1355,7 @@
         <p:spPr>
           <a:xfrm>
             <a:off x="152400" y="1556792"/>
-            <a:ext cx="8839200" cy="4708981"/>
+            <a:ext cx="8839200" cy="1631216"/>
           </a:xfrm>
           <a:prstGeom prst="rect">
             <a:avLst/>
@@ -1462,96 +1372,6 @@
               <a:rPr lang="fr-FR" sz="2000" dirty="0" smtClean="0"/>
               <a:t>La BDD GONIO est un tableau de suivi et d’export des relevés goniométriques.</a:t>
             </a:r>
-          </a:p>
-          <a:p>
-            <a:endParaRPr lang="fr-FR" sz="2000" dirty="0" smtClean="0"/>
-          </a:p>
-          <a:p>
-            <a:r>
-              <a:rPr lang="fr-FR" sz="2000" dirty="0" smtClean="0"/>
-              <a:t>Il s’agit d’un fichier Excel recensant les relevés dans un tableau avec :</a:t>
-            </a:r>
-          </a:p>
-          <a:p>
-            <a:pPr marL="342900" indent="-342900">
-              <a:buFontTx/>
-              <a:buChar char="-"/>
-            </a:pPr>
-            <a:r>
-              <a:rPr lang="fr-FR" sz="2000" dirty="0" smtClean="0"/>
-              <a:t>Heure du relevé</a:t>
-            </a:r>
-          </a:p>
-          <a:p>
-            <a:pPr marL="342900" indent="-342900">
-              <a:buFontTx/>
-              <a:buChar char="-"/>
-            </a:pPr>
-            <a:r>
-              <a:rPr lang="fr-FR" sz="2000" dirty="0" smtClean="0"/>
-              <a:t>Capteur</a:t>
-            </a:r>
-          </a:p>
-          <a:p>
-            <a:pPr marL="342900" indent="-342900">
-              <a:buFontTx/>
-              <a:buChar char="-"/>
-            </a:pPr>
-            <a:r>
-              <a:rPr lang="fr-FR" sz="2000" dirty="0" smtClean="0"/>
-              <a:t>Fréquence</a:t>
-            </a:r>
-          </a:p>
-          <a:p>
-            <a:pPr marL="342900" indent="-342900">
-              <a:buFontTx/>
-              <a:buChar char="-"/>
-            </a:pPr>
-            <a:r>
-              <a:rPr lang="fr-FR" sz="2000" dirty="0" smtClean="0"/>
-              <a:t>Indicatif</a:t>
-            </a:r>
-          </a:p>
-          <a:p>
-            <a:pPr marL="342900" indent="-342900">
-              <a:buFontTx/>
-              <a:buChar char="-"/>
-            </a:pPr>
-            <a:r>
-              <a:rPr lang="fr-FR" sz="2000" dirty="0" smtClean="0"/>
-              <a:t>Coordonnées capteur lors du relevé</a:t>
-            </a:r>
-          </a:p>
-          <a:p>
-            <a:pPr marL="342900" indent="-342900">
-              <a:buFontTx/>
-              <a:buChar char="-"/>
-            </a:pPr>
-            <a:r>
-              <a:rPr lang="fr-FR" sz="2000" dirty="0" smtClean="0"/>
-              <a:t>Azimut du relevé</a:t>
-            </a:r>
-          </a:p>
-          <a:p>
-            <a:pPr marL="342900" indent="-342900">
-              <a:buFontTx/>
-              <a:buChar char="-"/>
-            </a:pPr>
-            <a:r>
-              <a:rPr lang="fr-FR" sz="2000" dirty="0" smtClean="0"/>
-              <a:t>Couleur</a:t>
-            </a:r>
-          </a:p>
-          <a:p>
-            <a:pPr marL="342900" indent="-342900">
-              <a:buFontTx/>
-              <a:buChar char="-"/>
-            </a:pPr>
-            <a:r>
-              <a:rPr lang="fr-FR" sz="2000" dirty="0" smtClean="0"/>
-              <a:t>Groupe</a:t>
-            </a:r>
-            <a:endParaRPr lang="fr-FR" sz="2000" dirty="0"/>
           </a:p>
           <a:p>
             <a:endParaRPr lang="fr-FR" sz="2000" dirty="0" smtClean="0"/>
@@ -2537,7 +2357,15 @@
             </a:pPr>
             <a:r>
               <a:rPr lang="fr-FR" sz="2000" dirty="0" smtClean="0"/>
-              <a:t>X/LONG CAPT : coordonnée capteur</a:t>
+              <a:t>X/LONG CAPT : </a:t>
+            </a:r>
+            <a:r>
+              <a:rPr lang="fr-FR" sz="2000" dirty="0" smtClean="0"/>
+              <a:t>coordonnée longitude du </a:t>
+            </a:r>
+            <a:r>
+              <a:rPr lang="fr-FR" sz="2000" dirty="0" smtClean="0"/>
+              <a:t>capteur</a:t>
             </a:r>
           </a:p>
           <a:p>
@@ -2547,8 +2375,17 @@
             </a:pPr>
             <a:r>
               <a:rPr lang="fr-FR" sz="2000" dirty="0" smtClean="0"/>
-              <a:t>Y/LAT CAPT : c</a:t>
-            </a:r>
+              <a:t>Y/LAT CAPT : </a:t>
+            </a:r>
+            <a:r>
+              <a:rPr lang="fr-FR" sz="2000" dirty="0"/>
+              <a:t>coordonnée </a:t>
+            </a:r>
+            <a:r>
+              <a:rPr lang="fr-FR" sz="2000" dirty="0" smtClean="0"/>
+              <a:t>latitude du capteur</a:t>
+            </a:r>
+            <a:endParaRPr lang="fr-FR" sz="2000" dirty="0" smtClean="0"/>
           </a:p>
           <a:p>
             <a:pPr marL="342900" indent="-342900">
@@ -2557,8 +2394,9 @@
             </a:pPr>
             <a:r>
               <a:rPr lang="fr-FR" sz="2000" dirty="0" smtClean="0"/>
-              <a:t>AZM</a:t>
-            </a:r>
+              <a:t>AZM : azimut du relevé</a:t>
+            </a:r>
+            <a:endParaRPr lang="fr-FR" sz="2000" dirty="0" smtClean="0"/>
           </a:p>
           <a:p>
             <a:pPr marL="342900" indent="-342900">
@@ -2567,8 +2405,9 @@
             </a:pPr>
             <a:r>
               <a:rPr lang="fr-FR" sz="2000" dirty="0" smtClean="0"/>
-              <a:t>COULEUR</a:t>
-            </a:r>
+              <a:t>COULEUR : couleur du relevé</a:t>
+            </a:r>
+            <a:endParaRPr lang="fr-FR" sz="2000" dirty="0" smtClean="0"/>
           </a:p>
           <a:p>
             <a:pPr marL="342900" indent="-342900">
@@ -2577,8 +2416,9 @@
             </a:pPr>
             <a:r>
               <a:rPr lang="fr-FR" sz="2000" dirty="0" smtClean="0"/>
-              <a:t>GROUPE</a:t>
-            </a:r>
+              <a:t>GROUPE : </a:t>
+            </a:r>
+            <a:endParaRPr lang="fr-FR" sz="2000" dirty="0" smtClean="0"/>
           </a:p>
         </p:txBody>
       </p:sp>
@@ -2621,7 +2461,7 @@
         <p:spPr>
           <a:xfrm>
             <a:off x="400050" y="1071086"/>
-            <a:ext cx="8343900" cy="4524315"/>
+            <a:ext cx="8343900" cy="2308324"/>
           </a:xfrm>
           <a:prstGeom prst="rect">
             <a:avLst/>
@@ -2635,24 +2475,20 @@
           <a:p>
             <a:r>
               <a:rPr lang="fr-FR" dirty="0" smtClean="0"/>
-              <a:t>Pour générer un tir, </a:t>
+              <a:t>Pour générer un tir, seules les </a:t>
             </a:r>
             <a:r>
               <a:rPr lang="fr-FR" dirty="0" smtClean="0"/>
-              <a:t>seules </a:t>
+              <a:t>colonnes coordonnées et azimut sont nécessaires. Les autres colonnes alimentent </a:t>
             </a:r>
             <a:r>
               <a:rPr lang="fr-FR" dirty="0" smtClean="0"/>
-              <a:t>les colonnes X/LONG CAPT, Y/LAT CAPT et AZM sont nécessaires.</a:t>
-            </a:r>
-          </a:p>
-          <a:p>
+              <a:t>les métadonnées </a:t>
+            </a:r>
             <a:r>
               <a:rPr lang="fr-FR" dirty="0" smtClean="0"/>
-              <a:t>Rappel : chaque information indiquée dans le tableau alimente les métadonnées du relevé</a:t>
-            </a:r>
-          </a:p>
-          <a:p>
+              <a:t>de chaque relevé.</a:t>
+            </a:r>
             <a:endParaRPr lang="fr-FR" dirty="0" smtClean="0"/>
           </a:p>
           <a:p>
@@ -2661,7 +2497,25 @@
           <a:p>
             <a:r>
               <a:rPr lang="fr-FR" dirty="0" smtClean="0"/>
-              <a:t>Exemples de coordonnées fonctionnelles</a:t>
+              <a:t>Si </a:t>
+            </a:r>
+            <a:r>
+              <a:rPr lang="fr-FR" dirty="0" smtClean="0"/>
+              <a:t>en face d’une ligne apparaît «</a:t>
+            </a:r>
+            <a:r>
+              <a:rPr lang="fr-FR" dirty="0" smtClean="0"/>
+              <a:t> PROBLEME </a:t>
+            </a:r>
+            <a:r>
+              <a:rPr lang="fr-FR" dirty="0" smtClean="0"/>
+              <a:t>», vérifier le format des coordonnées et de l’azimut.</a:t>
+            </a:r>
+          </a:p>
+          <a:p>
+            <a:r>
+              <a:rPr lang="fr-FR" dirty="0" smtClean="0"/>
+              <a:t>Les lignes marquées « PROBLEME » ne sont pas générées, les autres le sont.</a:t>
             </a:r>
           </a:p>
           <a:p>
@@ -2670,46 +2524,7 @@
           <a:p>
             <a:r>
               <a:rPr lang="fr-FR" dirty="0" smtClean="0"/>
-              <a:t>48,86</a:t>
-            </a:r>
-            <a:endParaRPr lang="fr-FR" dirty="0"/>
-          </a:p>
-          <a:p>
-            <a:r>
-              <a:rPr lang="fr-FR" dirty="0"/>
-              <a:t>48.86°</a:t>
-            </a:r>
-          </a:p>
-          <a:p>
-            <a:r>
-              <a:rPr lang="fr-FR" dirty="0"/>
-              <a:t>48° 47' 32,8298" N</a:t>
-            </a:r>
-          </a:p>
-          <a:p>
-            <a:r>
-              <a:rPr lang="fr-FR" dirty="0"/>
-              <a:t>48 47 32 N</a:t>
-            </a:r>
-          </a:p>
-          <a:p>
-            <a:r>
-              <a:rPr lang="fr-FR" dirty="0"/>
-              <a:t>S 48° 47' </a:t>
-            </a:r>
-            <a:r>
-              <a:rPr lang="fr-FR" dirty="0" smtClean="0"/>
-              <a:t>32,8298"</a:t>
-            </a:r>
-            <a:endParaRPr lang="fr-FR" dirty="0" smtClean="0"/>
-          </a:p>
-          <a:p>
-            <a:endParaRPr lang="fr-FR" dirty="0"/>
-          </a:p>
-          <a:p>
-            <a:r>
-              <a:rPr lang="fr-FR" dirty="0" smtClean="0"/>
-              <a:t>Si une coordonnée ou un azimut est vide ou illisible, la ligne sera marquée en « PROBLEME »</a:t>
+              <a:t>Faire glisser le fichier KML généré dans Global Mapper pour l’afficher</a:t>
             </a:r>
             <a:endParaRPr lang="fr-FR" dirty="0"/>
           </a:p>
@@ -2756,609 +2571,6 @@
   <p:clrMapOvr>
     <a:masterClrMapping/>
   </p:clrMapOvr>
-</p:sld>
-</file>
-
-<file path=ppt/slides/slide6.xml><?xml version="1.0" encoding="utf-8"?>
-<p:sld xmlns:a="http://schemas.openxmlformats.org/drawingml/2006/main" xmlns:r="http://schemas.openxmlformats.org/officeDocument/2006/relationships" xmlns:p="http://schemas.openxmlformats.org/presentationml/2006/main">
-  <p:cSld>
-    <p:spTree>
-      <p:nvGrpSpPr>
-        <p:cNvPr id="1" name=""/>
-        <p:cNvGrpSpPr/>
-        <p:nvPr/>
-      </p:nvGrpSpPr>
-      <p:grpSpPr>
-        <a:xfrm>
-          <a:off x="0" y="0"/>
-          <a:ext cx="0" cy="0"/>
-          <a:chOff x="0" y="0"/>
-          <a:chExt cx="0" cy="0"/>
-        </a:xfrm>
-      </p:grpSpPr>
-      <p:sp>
-        <p:nvSpPr>
-          <p:cNvPr id="2" name="ZoneTexte 1"/>
-          <p:cNvSpPr txBox="1"/>
-          <p:nvPr/>
-        </p:nvSpPr>
-        <p:spPr>
-          <a:xfrm>
-            <a:off x="0" y="188640"/>
-            <a:ext cx="9144000" cy="400110"/>
-          </a:xfrm>
-          <a:prstGeom prst="rect">
-            <a:avLst/>
-          </a:prstGeom>
-          <a:noFill/>
-        </p:spPr>
-        <p:txBody>
-          <a:bodyPr wrap="square" rtlCol="0">
-            <a:spAutoFit/>
-          </a:bodyPr>
-          <a:lstStyle/>
-          <a:p>
-            <a:pPr algn="ctr"/>
-            <a:r>
-              <a:rPr lang="fr-FR" sz="2000" b="1" dirty="0" smtClean="0"/>
-              <a:t>Rappels</a:t>
-            </a:r>
-            <a:endParaRPr lang="fr-FR" sz="2000" b="1" dirty="0"/>
-          </a:p>
-        </p:txBody>
-      </p:sp>
-      <p:sp>
-        <p:nvSpPr>
-          <p:cNvPr id="3" name="ZoneTexte 2"/>
-          <p:cNvSpPr txBox="1"/>
-          <p:nvPr/>
-        </p:nvSpPr>
-        <p:spPr>
-          <a:xfrm>
-            <a:off x="491319" y="1173707"/>
-            <a:ext cx="8120418" cy="5355312"/>
-          </a:xfrm>
-          <a:prstGeom prst="rect">
-            <a:avLst/>
-          </a:prstGeom>
-          <a:noFill/>
-        </p:spPr>
-        <p:txBody>
-          <a:bodyPr wrap="square" rtlCol="0">
-            <a:spAutoFit/>
-          </a:bodyPr>
-          <a:lstStyle/>
-          <a:p>
-            <a:pPr marL="285750" indent="-285750">
-              <a:buFontTx/>
-              <a:buChar char="-"/>
-            </a:pPr>
-            <a:r>
-              <a:rPr lang="fr-FR" dirty="0" smtClean="0"/>
-              <a:t>Cet outil a pour but de lister des relevés </a:t>
-            </a:r>
-            <a:r>
-              <a:rPr lang="fr-FR" dirty="0" err="1" smtClean="0"/>
-              <a:t>gonio</a:t>
-            </a:r>
-            <a:r>
-              <a:rPr lang="fr-FR" dirty="0" smtClean="0"/>
-              <a:t> pour créer un fichier KML importable sur </a:t>
-            </a:r>
-            <a:r>
-              <a:rPr lang="fr-FR" dirty="0" err="1" smtClean="0"/>
-              <a:t>GlobalMapper</a:t>
-            </a:r>
-            <a:r>
-              <a:rPr lang="fr-FR" dirty="0" smtClean="0"/>
-              <a:t>, et ainsi avoir un visuel des relevés effectués sur telle fréquence, tel indicatif</a:t>
-            </a:r>
-          </a:p>
-          <a:p>
-            <a:pPr marL="285750" indent="-285750">
-              <a:buFontTx/>
-              <a:buChar char="-"/>
-            </a:pPr>
-            <a:endParaRPr lang="fr-FR" dirty="0" smtClean="0"/>
-          </a:p>
-          <a:p>
-            <a:pPr marL="285750" indent="-285750">
-              <a:buFontTx/>
-              <a:buChar char="-"/>
-            </a:pPr>
-            <a:r>
-              <a:rPr lang="fr-FR" dirty="0" smtClean="0"/>
-              <a:t>Pour être valide, un tir a besoin AU MINIMUM de la position Y et X (latitude et longitude) du capteur et d’un azimut</a:t>
-            </a:r>
-          </a:p>
-          <a:p>
-            <a:pPr marL="285750" indent="-285750">
-              <a:buFontTx/>
-              <a:buChar char="-"/>
-            </a:pPr>
-            <a:endParaRPr lang="fr-FR" dirty="0"/>
-          </a:p>
-          <a:p>
-            <a:pPr marL="285750" indent="-285750">
-              <a:buFontTx/>
-              <a:buChar char="-"/>
-            </a:pPr>
-            <a:r>
-              <a:rPr lang="fr-FR" dirty="0" smtClean="0"/>
-              <a:t>Les coordonnées peuvent être indiquées en degré/minutes/secondes ou en décimales, pourvu que le format ne soit pas trop exotique</a:t>
-            </a:r>
-          </a:p>
-          <a:p>
-            <a:pPr marL="285750" indent="-285750">
-              <a:buFontTx/>
-              <a:buChar char="-"/>
-            </a:pPr>
-            <a:endParaRPr lang="fr-FR" dirty="0"/>
-          </a:p>
-          <a:p>
-            <a:pPr marL="285750" indent="-285750">
-              <a:buFontTx/>
-              <a:buChar char="-"/>
-            </a:pPr>
-            <a:r>
-              <a:rPr lang="fr-FR" dirty="0" smtClean="0"/>
-              <a:t>Un convertisseur DMS &lt;-&gt; décimales est inclus dans l’outil si besoin</a:t>
-            </a:r>
-          </a:p>
-          <a:p>
-            <a:pPr marL="285750" indent="-285750">
-              <a:buFontTx/>
-              <a:buChar char="-"/>
-            </a:pPr>
-            <a:endParaRPr lang="fr-FR" dirty="0"/>
-          </a:p>
-          <a:p>
-            <a:pPr marL="285750" indent="-285750">
-              <a:buFontTx/>
-              <a:buChar char="-"/>
-            </a:pPr>
-            <a:r>
-              <a:rPr lang="fr-FR" dirty="0" smtClean="0"/>
-              <a:t>Les tirs sont nommés automatiquement de la façon suivante : « GDH / FRQ / API »</a:t>
-            </a:r>
-          </a:p>
-          <a:p>
-            <a:pPr marL="285750" indent="-285750">
-              <a:buFontTx/>
-              <a:buChar char="-"/>
-            </a:pPr>
-            <a:endParaRPr lang="fr-FR" dirty="0"/>
-          </a:p>
-          <a:p>
-            <a:pPr marL="285750" indent="-285750">
-              <a:buFontTx/>
-              <a:buChar char="-"/>
-            </a:pPr>
-            <a:r>
-              <a:rPr lang="fr-FR" dirty="0" smtClean="0"/>
-              <a:t>Les tirs peuvent avoir les couleurs suivantes </a:t>
-            </a:r>
-            <a:r>
-              <a:rPr lang="fr-FR" dirty="0"/>
-              <a:t>: bleu, rouge, jaune, vert, violet, orange, rose, gris, noir et </a:t>
-            </a:r>
-            <a:r>
-              <a:rPr lang="fr-FR" dirty="0" smtClean="0"/>
-              <a:t>blanc.</a:t>
-            </a:r>
-          </a:p>
-          <a:p>
-            <a:pPr marL="285750" indent="-285750">
-              <a:buFontTx/>
-              <a:buChar char="-"/>
-            </a:pPr>
-            <a:endParaRPr lang="fr-FR" dirty="0"/>
-          </a:p>
-          <a:p>
-            <a:pPr marL="285750" indent="-285750">
-              <a:buFontTx/>
-              <a:buChar char="-"/>
-            </a:pPr>
-            <a:r>
-              <a:rPr lang="fr-FR" dirty="0" smtClean="0"/>
-              <a:t>Il suffit de faire glisser le fichier KML dans </a:t>
-            </a:r>
-            <a:r>
-              <a:rPr lang="fr-FR" dirty="0" err="1" smtClean="0"/>
-              <a:t>GlobalMapper</a:t>
-            </a:r>
-            <a:r>
-              <a:rPr lang="fr-FR" dirty="0" smtClean="0"/>
-              <a:t> pour l’importer</a:t>
-            </a:r>
-          </a:p>
-          <a:p>
-            <a:pPr marL="285750" indent="-285750">
-              <a:buFontTx/>
-              <a:buChar char="-"/>
-            </a:pPr>
-            <a:endParaRPr lang="fr-FR" dirty="0"/>
-          </a:p>
-        </p:txBody>
-      </p:sp>
-    </p:spTree>
-    <p:extLst>
-      <p:ext uri="{BB962C8B-B14F-4D97-AF65-F5344CB8AC3E}">
-        <p14:creationId xmlns:p14="http://schemas.microsoft.com/office/powerpoint/2010/main" val="2842698796"/>
-      </p:ext>
-    </p:extLst>
-  </p:cSld>
-  <p:clrMapOvr>
-    <a:masterClrMapping/>
-  </p:clrMapOvr>
-</p:sld>
-</file>
-
-<file path=ppt/slides/slide7.xml><?xml version="1.0" encoding="utf-8"?>
-<p:sld xmlns:a="http://schemas.openxmlformats.org/drawingml/2006/main" xmlns:r="http://schemas.openxmlformats.org/officeDocument/2006/relationships" xmlns:p="http://schemas.openxmlformats.org/presentationml/2006/main">
-  <p:cSld>
-    <p:spTree>
-      <p:nvGrpSpPr>
-        <p:cNvPr id="1" name=""/>
-        <p:cNvGrpSpPr/>
-        <p:nvPr/>
-      </p:nvGrpSpPr>
-      <p:grpSpPr>
-        <a:xfrm>
-          <a:off x="0" y="0"/>
-          <a:ext cx="0" cy="0"/>
-          <a:chOff x="0" y="0"/>
-          <a:chExt cx="0" cy="0"/>
-        </a:xfrm>
-      </p:grpSpPr>
-      <p:sp>
-        <p:nvSpPr>
-          <p:cNvPr id="2" name="ZoneTexte 1"/>
-          <p:cNvSpPr txBox="1"/>
-          <p:nvPr/>
-        </p:nvSpPr>
-        <p:spPr>
-          <a:xfrm>
-            <a:off x="0" y="188640"/>
-            <a:ext cx="9144000" cy="400110"/>
-          </a:xfrm>
-          <a:prstGeom prst="rect">
-            <a:avLst/>
-          </a:prstGeom>
-          <a:noFill/>
-        </p:spPr>
-        <p:txBody>
-          <a:bodyPr wrap="square" rtlCol="0">
-            <a:spAutoFit/>
-          </a:bodyPr>
-          <a:lstStyle/>
-          <a:p>
-            <a:pPr algn="ctr"/>
-            <a:r>
-              <a:rPr lang="fr-FR" sz="2000" b="1" dirty="0" smtClean="0"/>
-              <a:t>Rappels</a:t>
-            </a:r>
-            <a:endParaRPr lang="fr-FR" sz="2000" b="1" dirty="0"/>
-          </a:p>
-        </p:txBody>
-      </p:sp>
-      <p:sp>
-        <p:nvSpPr>
-          <p:cNvPr id="3" name="ZoneTexte 2"/>
-          <p:cNvSpPr txBox="1"/>
-          <p:nvPr/>
-        </p:nvSpPr>
-        <p:spPr>
-          <a:xfrm>
-            <a:off x="491319" y="1173707"/>
-            <a:ext cx="8120418" cy="2585323"/>
-          </a:xfrm>
-          <a:prstGeom prst="rect">
-            <a:avLst/>
-          </a:prstGeom>
-          <a:noFill/>
-        </p:spPr>
-        <p:txBody>
-          <a:bodyPr wrap="square" rtlCol="0">
-            <a:spAutoFit/>
-          </a:bodyPr>
-          <a:lstStyle/>
-          <a:p>
-            <a:pPr marL="285750" indent="-285750">
-              <a:buFontTx/>
-              <a:buChar char="-"/>
-            </a:pPr>
-            <a:r>
-              <a:rPr lang="fr-FR" dirty="0" smtClean="0"/>
-              <a:t>Les tirs sont nommés automatiquement de la façon suivante : « GDH / FRQ / API »</a:t>
-            </a:r>
-          </a:p>
-          <a:p>
-            <a:pPr marL="285750" indent="-285750">
-              <a:buFontTx/>
-              <a:buChar char="-"/>
-            </a:pPr>
-            <a:endParaRPr lang="fr-FR" dirty="0"/>
-          </a:p>
-          <a:p>
-            <a:pPr marL="285750" indent="-285750">
-              <a:buFontTx/>
-              <a:buChar char="-"/>
-            </a:pPr>
-            <a:r>
-              <a:rPr lang="fr-FR" dirty="0" smtClean="0"/>
-              <a:t>Il suffit de faire glisser le fichier KML dans </a:t>
-            </a:r>
-            <a:r>
-              <a:rPr lang="fr-FR" dirty="0" err="1" smtClean="0"/>
-              <a:t>GlobalMapper</a:t>
-            </a:r>
-            <a:r>
-              <a:rPr lang="fr-FR" dirty="0" smtClean="0"/>
-              <a:t> pour l’importer</a:t>
-            </a:r>
-          </a:p>
-          <a:p>
-            <a:pPr marL="285750" indent="-285750">
-              <a:buFontTx/>
-              <a:buChar char="-"/>
-            </a:pPr>
-            <a:endParaRPr lang="fr-FR" dirty="0" smtClean="0"/>
-          </a:p>
-          <a:p>
-            <a:pPr marL="285750" indent="-285750">
-              <a:buFontTx/>
-              <a:buChar char="-"/>
-            </a:pPr>
-            <a:r>
-              <a:rPr lang="fr-FR" dirty="0" smtClean="0"/>
-              <a:t>Les relevés et les points positions capteur ont pour attributs (métadonnées vecteur) toutes les données indiquées dans le tableau</a:t>
-            </a:r>
-          </a:p>
-          <a:p>
-            <a:pPr marL="285750" indent="-285750">
-              <a:buFontTx/>
-              <a:buChar char="-"/>
-            </a:pPr>
-            <a:endParaRPr lang="fr-FR" dirty="0"/>
-          </a:p>
-          <a:p>
-            <a:pPr marL="285750" indent="-285750">
-              <a:buFontTx/>
-              <a:buChar char="-"/>
-            </a:pPr>
-            <a:r>
-              <a:rPr lang="fr-FR" dirty="0" smtClean="0"/>
-              <a:t>La colonne groupe est un champ libre pour éventuellement exploitation sous </a:t>
-            </a:r>
-            <a:r>
-              <a:rPr lang="fr-FR" dirty="0" err="1" smtClean="0"/>
-              <a:t>GlobalMapper</a:t>
-            </a:r>
-            <a:endParaRPr lang="fr-FR" dirty="0"/>
-          </a:p>
-        </p:txBody>
-      </p:sp>
-    </p:spTree>
-    <p:extLst>
-      <p:ext uri="{BB962C8B-B14F-4D97-AF65-F5344CB8AC3E}">
-        <p14:creationId xmlns:p14="http://schemas.microsoft.com/office/powerpoint/2010/main" val="2421691216"/>
-      </p:ext>
-    </p:extLst>
-  </p:cSld>
-  <p:clrMapOvr>
-    <a:masterClrMapping/>
-  </p:clrMapOvr>
-</p:sld>
-</file>
-
-<file path=ppt/slides/slide8.xml><?xml version="1.0" encoding="utf-8"?>
-<p:sld xmlns:a="http://schemas.openxmlformats.org/drawingml/2006/main" xmlns:r="http://schemas.openxmlformats.org/officeDocument/2006/relationships" xmlns:p="http://schemas.openxmlformats.org/presentationml/2006/main">
-  <p:cSld>
-    <p:spTree>
-      <p:nvGrpSpPr>
-        <p:cNvPr id="1" name=""/>
-        <p:cNvGrpSpPr/>
-        <p:nvPr/>
-      </p:nvGrpSpPr>
-      <p:grpSpPr>
-        <a:xfrm>
-          <a:off x="0" y="0"/>
-          <a:ext cx="0" cy="0"/>
-          <a:chOff x="0" y="0"/>
-          <a:chExt cx="0" cy="0"/>
-        </a:xfrm>
-      </p:grpSpPr>
-      <p:sp>
-        <p:nvSpPr>
-          <p:cNvPr id="4" name="ZoneTexte 3"/>
-          <p:cNvSpPr txBox="1"/>
-          <p:nvPr/>
-        </p:nvSpPr>
-        <p:spPr>
-          <a:xfrm>
-            <a:off x="-20960" y="548680"/>
-            <a:ext cx="9144000" cy="584775"/>
-          </a:xfrm>
-          <a:prstGeom prst="rect">
-            <a:avLst/>
-          </a:prstGeom>
-          <a:noFill/>
-        </p:spPr>
-        <p:txBody>
-          <a:bodyPr wrap="square" rtlCol="0">
-            <a:spAutoFit/>
-          </a:bodyPr>
-          <a:lstStyle/>
-          <a:p>
-            <a:pPr algn="ctr"/>
-            <a:r>
-              <a:rPr lang="fr-FR" sz="3200" b="1" dirty="0" smtClean="0"/>
-              <a:t>Utilisation avancée</a:t>
-            </a:r>
-            <a:endParaRPr lang="fr-FR" sz="1600" b="1" dirty="0" smtClean="0"/>
-          </a:p>
-        </p:txBody>
-      </p:sp>
-      <p:sp>
-        <p:nvSpPr>
-          <p:cNvPr id="5" name="ZoneTexte 4"/>
-          <p:cNvSpPr txBox="1"/>
-          <p:nvPr/>
-        </p:nvSpPr>
-        <p:spPr>
-          <a:xfrm>
-            <a:off x="152400" y="1556792"/>
-            <a:ext cx="8839200" cy="4708981"/>
-          </a:xfrm>
-          <a:prstGeom prst="rect">
-            <a:avLst/>
-          </a:prstGeom>
-          <a:noFill/>
-        </p:spPr>
-        <p:txBody>
-          <a:bodyPr wrap="square" rtlCol="0">
-            <a:spAutoFit/>
-          </a:bodyPr>
-          <a:lstStyle/>
-          <a:p>
-            <a:r>
-              <a:rPr lang="fr-FR" sz="2000" dirty="0" smtClean="0"/>
-              <a:t>Les paramètres suivants sont accessibles dans l’onglet caché « data »</a:t>
-            </a:r>
-          </a:p>
-          <a:p>
-            <a:pPr marL="342900" indent="-342900">
-              <a:buFontTx/>
-              <a:buChar char="-"/>
-            </a:pPr>
-            <a:endParaRPr lang="fr-FR" sz="2000" dirty="0" smtClean="0"/>
-          </a:p>
-          <a:p>
-            <a:pPr marL="342900" indent="-342900">
-              <a:buFontTx/>
-              <a:buChar char="-"/>
-            </a:pPr>
-            <a:r>
-              <a:rPr lang="fr-FR" sz="2000" dirty="0" smtClean="0"/>
-              <a:t>Liste des couleurs et leur valeur en hexadécimal</a:t>
-            </a:r>
-          </a:p>
-          <a:p>
-            <a:pPr marL="342900" indent="-342900">
-              <a:buFontTx/>
-              <a:buChar char="-"/>
-            </a:pPr>
-            <a:endParaRPr lang="fr-FR" sz="2000" dirty="0" smtClean="0"/>
-          </a:p>
-          <a:p>
-            <a:pPr marL="342900" indent="-342900">
-              <a:buFontTx/>
-              <a:buChar char="-"/>
-            </a:pPr>
-            <a:r>
-              <a:rPr lang="fr-FR" sz="2000" dirty="0" smtClean="0"/>
-              <a:t>Epaisseur du trait affiché sur </a:t>
-            </a:r>
-            <a:r>
-              <a:rPr lang="fr-FR" sz="2000" dirty="0" err="1" smtClean="0"/>
-              <a:t>GlobalMapper</a:t>
-            </a:r>
-            <a:endParaRPr lang="fr-FR" sz="2000" dirty="0" smtClean="0"/>
-          </a:p>
-          <a:p>
-            <a:pPr marL="342900" indent="-342900">
-              <a:buFontTx/>
-              <a:buChar char="-"/>
-            </a:pPr>
-            <a:endParaRPr lang="fr-FR" sz="2000" dirty="0" smtClean="0"/>
-          </a:p>
-          <a:p>
-            <a:pPr marL="342900" indent="-342900">
-              <a:buFontTx/>
-              <a:buChar char="-"/>
-            </a:pPr>
-            <a:r>
-              <a:rPr lang="fr-FR" sz="2000" dirty="0" smtClean="0"/>
-              <a:t>Point capteur : si « oui », crée des entités de points pour marquer la position du capteur</a:t>
-            </a:r>
-          </a:p>
-          <a:p>
-            <a:pPr marL="342900" indent="-342900">
-              <a:buFontTx/>
-              <a:buChar char="-"/>
-            </a:pPr>
-            <a:endParaRPr lang="fr-FR" sz="2000" dirty="0" smtClean="0"/>
-          </a:p>
-          <a:p>
-            <a:pPr marL="342900" indent="-342900">
-              <a:buFontTx/>
-              <a:buChar char="-"/>
-            </a:pPr>
-            <a:r>
-              <a:rPr lang="fr-FR" sz="2000" dirty="0" smtClean="0"/>
-              <a:t>Style </a:t>
-            </a:r>
-            <a:r>
-              <a:rPr lang="fr-FR" sz="2000" dirty="0"/>
-              <a:t>point </a:t>
-            </a:r>
-            <a:r>
-              <a:rPr lang="fr-FR" sz="2000" dirty="0" smtClean="0"/>
-              <a:t>capteur : Nom du style de point, propre à </a:t>
-            </a:r>
-            <a:r>
-              <a:rPr lang="fr-FR" sz="2000" dirty="0" err="1" smtClean="0"/>
-              <a:t>GlobalMapper</a:t>
-            </a:r>
-            <a:r>
-              <a:rPr lang="fr-FR" sz="2000" dirty="0" smtClean="0"/>
-              <a:t>, utilisé pour symboliser la position capteur</a:t>
-            </a:r>
-          </a:p>
-          <a:p>
-            <a:pPr marL="342900" indent="-342900">
-              <a:buFontTx/>
-              <a:buChar char="-"/>
-            </a:pPr>
-            <a:endParaRPr lang="fr-FR" sz="2000" dirty="0" smtClean="0"/>
-          </a:p>
-          <a:p>
-            <a:pPr marL="342900" indent="-342900">
-              <a:buFontTx/>
-              <a:buChar char="-"/>
-            </a:pPr>
-            <a:r>
-              <a:rPr lang="fr-FR" sz="2000" dirty="0" smtClean="0"/>
-              <a:t>Masque nom du tir : Le nom de n’importe quelle colonne peut y être indiqué entre accolades (ex : {AZM}) </a:t>
-            </a:r>
-          </a:p>
-          <a:p>
-            <a:pPr marL="342900" indent="-342900">
-              <a:buFontTx/>
-              <a:buChar char="-"/>
-            </a:pPr>
-            <a:endParaRPr lang="fr-FR" sz="2000" dirty="0"/>
-          </a:p>
-        </p:txBody>
-      </p:sp>
-    </p:spTree>
-    <p:extLst>
-      <p:ext uri="{BB962C8B-B14F-4D97-AF65-F5344CB8AC3E}">
-        <p14:creationId xmlns:p14="http://schemas.microsoft.com/office/powerpoint/2010/main" val="3605238459"/>
-      </p:ext>
-    </p:extLst>
-  </p:cSld>
-  <p:clrMapOvr>
-    <a:masterClrMapping/>
-  </p:clrMapOvr>
-  <p:timing>
-    <p:tnLst>
-      <p:par>
-        <p:cTn id="1" dur="indefinite" restart="never" nodeType="tmRoot"/>
-      </p:par>
-    </p:tnLst>
-  </p:timing>
 </p:sld>
 </file>
 

</xml_diff>